<commit_message>
Add few slides based on white slide template
</commit_message>
<xml_diff>
--- a/The Power of Secrets.pptx
+++ b/The Power of Secrets.pptx
@@ -5,10 +5,12 @@
     <p:sldMasterId id="2147483648" r:id="rId1"/>
   </p:sldMasterIdLst>
   <p:notesMasterIdLst>
-    <p:notesMasterId r:id="rId3"/>
+    <p:notesMasterId r:id="rId5"/>
   </p:notesMasterIdLst>
   <p:sldIdLst>
     <p:sldId id="256" r:id="rId2"/>
+    <p:sldId id="257" r:id="rId3"/>
+    <p:sldId id="258" r:id="rId4"/>
   </p:sldIdLst>
   <p:sldSz cx="24384000" cy="13716000"/>
   <p:notesSz cx="6858000" cy="9144000"/>
@@ -311,6 +313,46 @@
     </a:lvl9pPr>
   </p:defaultTextStyle>
   <p:extLst>
+    <p:ext uri="{521415D9-36F7-43E2-AB2F-B90AF26B5E84}">
+      <p14:sectionLst xmlns:p14="http://schemas.microsoft.com/office/powerpoint/2010/main">
+        <p14:section name="Start" id="{084E67ED-3230-46D2-804F-D34DD634E221}">
+          <p14:sldIdLst>
+            <p14:sldId id="256"/>
+          </p14:sldIdLst>
+        </p14:section>
+        <p14:section name="Intro" id="{A118980B-90B9-45B0-B1B8-D59B6CC57D84}">
+          <p14:sldIdLst>
+            <p14:sldId id="257"/>
+          </p14:sldIdLst>
+        </p14:section>
+        <p14:section name="Me" id="{D0261A3F-921F-4BCB-8A68-5D3E0779338B}">
+          <p14:sldIdLst>
+            <p14:sldId id="258"/>
+          </p14:sldIdLst>
+        </p14:section>
+        <p14:section name="What does TG mean" id="{3CAD5E0B-B97F-4A17-AF6B-889473F1B17B}">
+          <p14:sldIdLst/>
+        </p14:section>
+        <p14:section name="Being stealth &amp; effects" id="{0281703B-828B-4436-9256-EDCF01D5956D}">
+          <p14:sldIdLst/>
+        </p14:section>
+        <p14:section name="The blog post" id="{E08FE059-CBC4-41FD-9211-86349A1A3D82}">
+          <p14:sldIdLst/>
+        </p14:section>
+        <p14:section name="Being out &amp; effects" id="{5AF50B61-AB32-4DC9-9CC9-2B961C3308FF}">
+          <p14:sldIdLst/>
+        </p14:section>
+        <p14:section name="On being vulnerable" id="{00EB6EA9-F45E-4CE7-8D30-B20467E882E1}">
+          <p14:sldIdLst/>
+        </p14:section>
+        <p14:section name="Embracing vulnerability" id="{4B1345D5-04C3-41FD-8115-0970BC3237A7}">
+          <p14:sldIdLst/>
+        </p14:section>
+        <p14:section name="Conclusion" id="{C2125658-4C25-4417-A069-DFDBCC0D2B6C}">
+          <p14:sldIdLst/>
+        </p14:section>
+      </p14:sectionLst>
+    </p:ext>
     <p:ext uri="{EFAFB233-063F-42B5-8137-9DF3F51BA10A}">
       <p15:sldGuideLst xmlns:p15="http://schemas.microsoft.com/office/powerpoint/2012/main"/>
     </p:ext>
@@ -3513,7 +3555,11 @@
             <a:pPr defTabSz="643889">
               <a:defRPr sz="10685"/>
             </a:pPr>
-            <a:endParaRPr/>
+            <a:r>
+              <a:rPr lang="en-US" dirty="0" smtClean="0"/>
+              <a:t>The Power of Secrets</a:t>
+            </a:r>
+            <a:endParaRPr dirty="0"/>
           </a:p>
         </p:txBody>
       </p:sp>
@@ -3533,14 +3579,123 @@
           </a:prstGeom>
         </p:spPr>
         <p:txBody>
-          <a:bodyPr/>
+          <a:bodyPr>
+            <a:normAutofit/>
+          </a:bodyPr>
           <a:lstStyle/>
           <a:p>
-            <a:endParaRPr/>
+            <a:r>
+              <a:rPr lang="en-US" dirty="0" smtClean="0"/>
+              <a:t>Slides: geekygirlsarah.com/secrets</a:t>
+            </a:r>
+          </a:p>
+          <a:p>
+            <a:r>
+              <a:rPr lang="en-US" dirty="0" smtClean="0"/>
+              <a:t>Twitter: @geekygirlsarah</a:t>
+            </a:r>
+            <a:endParaRPr lang="en-US" dirty="0"/>
+          </a:p>
+          <a:p>
+            <a:r>
+              <a:rPr lang="en-US" dirty="0" smtClean="0"/>
+              <a:t>Please feel free to tweet along.</a:t>
+            </a:r>
+            <a:endParaRPr dirty="0"/>
           </a:p>
         </p:txBody>
       </p:sp>
     </p:spTree>
+  </p:cSld>
+  <p:clrMapOvr>
+    <a:masterClrMapping/>
+  </p:clrMapOvr>
+  <p:transition spd="med"/>
+</p:sld>
+</file>
+
+<file path=ppt/slides/slide2.xml><?xml version="1.0" encoding="utf-8"?>
+<p:sld xmlns:a="http://schemas.openxmlformats.org/drawingml/2006/main" xmlns:r="http://schemas.openxmlformats.org/officeDocument/2006/relationships" xmlns:p="http://schemas.openxmlformats.org/presentationml/2006/main">
+  <p:cSld>
+    <p:spTree>
+      <p:nvGrpSpPr>
+        <p:cNvPr id="1" name=""/>
+        <p:cNvGrpSpPr/>
+        <p:nvPr/>
+      </p:nvGrpSpPr>
+      <p:grpSpPr>
+        <a:xfrm>
+          <a:off x="0" y="0"/>
+          <a:ext cx="0" cy="0"/>
+          <a:chOff x="0" y="0"/>
+          <a:chExt cx="0" cy="0"/>
+        </a:xfrm>
+      </p:grpSpPr>
+      <p:sp>
+        <p:nvSpPr>
+          <p:cNvPr id="2" name="Text Placeholder 1"/>
+          <p:cNvSpPr>
+            <a:spLocks noGrp="1"/>
+          </p:cNvSpPr>
+          <p:nvPr>
+            <p:ph type="body" sz="quarter" idx="13"/>
+          </p:nvPr>
+        </p:nvSpPr>
+        <p:spPr>
+          <a:xfrm>
+            <a:off x="1342329" y="12626963"/>
+            <a:ext cx="4918013" cy="872034"/>
+          </a:xfrm>
+        </p:spPr>
+        <p:txBody>
+          <a:bodyPr/>
+          <a:lstStyle/>
+          <a:p>
+            <a:r>
+              <a:rPr lang="en-US" dirty="0" smtClean="0"/>
+              <a:t>@geekygirlsarah</a:t>
+            </a:r>
+            <a:endParaRPr lang="en-US" dirty="0"/>
+          </a:p>
+        </p:txBody>
+      </p:sp>
+    </p:spTree>
+    <p:extLst>
+      <p:ext uri="{BB962C8B-B14F-4D97-AF65-F5344CB8AC3E}">
+        <p14:creationId xmlns:p14="http://schemas.microsoft.com/office/powerpoint/2010/main" val="2643670695"/>
+      </p:ext>
+    </p:extLst>
+  </p:cSld>
+  <p:clrMapOvr>
+    <a:masterClrMapping/>
+  </p:clrMapOvr>
+  <p:transition spd="med"/>
+</p:sld>
+</file>
+
+<file path=ppt/slides/slide3.xml><?xml version="1.0" encoding="utf-8"?>
+<p:sld xmlns:a="http://schemas.openxmlformats.org/drawingml/2006/main" xmlns:r="http://schemas.openxmlformats.org/officeDocument/2006/relationships" xmlns:p="http://schemas.openxmlformats.org/presentationml/2006/main">
+  <p:cSld>
+    <p:spTree>
+      <p:nvGrpSpPr>
+        <p:cNvPr id="1" name=""/>
+        <p:cNvGrpSpPr/>
+        <p:nvPr/>
+      </p:nvGrpSpPr>
+      <p:grpSpPr>
+        <a:xfrm>
+          <a:off x="0" y="0"/>
+          <a:ext cx="0" cy="0"/>
+          <a:chOff x="0" y="0"/>
+          <a:chExt cx="0" cy="0"/>
+        </a:xfrm>
+      </p:grpSpPr>
+    </p:spTree>
+    <p:extLst>
+      <p:ext uri="{BB962C8B-B14F-4D97-AF65-F5344CB8AC3E}">
+        <p14:creationId xmlns:p14="http://schemas.microsoft.com/office/powerpoint/2010/main" val="1459367277"/>
+      </p:ext>
+    </p:extLst>
   </p:cSld>
   <p:clrMapOvr>
     <a:masterClrMapping/>

</xml_diff>